<commit_message>
renamed a class: and related variables
git-svn-id: svn+ssh://develop01.dans.knaw.nl/development/svn/repos/mixed/easy-sword/trunk@10883 a75a9a65-0d41-4860-8c96-5fae3ec79aa9
</commit_message>
<xml_diff>
--- a/doc/overview.pptx
+++ b/doc/overview.pptx
@@ -3141,7 +3141,7 @@
         </p:nvSpPr>
         <p:spPr>
           <a:xfrm>
-            <a:off x="4186886" y="1297997"/>
+            <a:off x="4204184" y="1613739"/>
             <a:ext cx="4441710" cy="5018360"/>
           </a:xfrm>
           <a:prstGeom prst="cloud">
@@ -3179,6 +3179,18 @@
               <a:rPr lang="en-US" dirty="0" err="1" smtClean="0"/>
               <a:t>sword.jar</a:t>
             </a:r>
+            <a:endParaRPr lang="en-US" dirty="0" smtClean="0"/>
+          </a:p>
+          <a:p>
+            <a:pPr algn="ctr"/>
+            <a:endParaRPr lang="en-US" dirty="0" smtClean="0"/>
+          </a:p>
+          <a:p>
+            <a:pPr algn="ctr"/>
+            <a:endParaRPr lang="en-US" dirty="0" smtClean="0"/>
+          </a:p>
+          <a:p>
+            <a:pPr algn="ctr"/>
             <a:endParaRPr lang="en-US" dirty="0"/>
           </a:p>
         </p:txBody>
@@ -3250,9 +3262,25 @@
           <a:p>
             <a:pPr algn="ctr"/>
             <a:r>
+              <a:rPr lang="en-US" sz="1200" dirty="0"/>
+              <a:t>s</a:t>
+            </a:r>
+            <a:r>
               <a:rPr lang="en-US" sz="1200" dirty="0" smtClean="0"/>
-              <a:t>Sword-common-1-1.jar</a:t>
-            </a:r>
+              <a:t>word-common-1-1.jar</a:t>
+            </a:r>
+          </a:p>
+          <a:p>
+            <a:pPr algn="ctr"/>
+            <a:endParaRPr lang="en-US" sz="1200" dirty="0" smtClean="0"/>
+          </a:p>
+          <a:p>
+            <a:pPr algn="ctr"/>
+            <a:r>
+              <a:rPr lang="en-US" sz="1200" dirty="0" err="1" smtClean="0"/>
+              <a:t>org.purl.sword.client</a:t>
+            </a:r>
+            <a:endParaRPr lang="en-US" sz="1200" dirty="0" smtClean="0"/>
           </a:p>
           <a:p>
             <a:pPr algn="ctr"/>
@@ -3275,7 +3303,7 @@
         <p:spPr>
           <a:xfrm flipV="1">
             <a:off x="3654344" y="3086151"/>
-            <a:ext cx="1877736" cy="32935"/>
+            <a:ext cx="1566087" cy="32936"/>
           </a:xfrm>
           <a:prstGeom prst="line">
             <a:avLst/>
@@ -3313,16 +3341,16 @@
         </p:spPr>
         <p:style>
           <a:lnRef idx="1">
-            <a:schemeClr val="accent1"/>
+            <a:schemeClr val="accent3"/>
           </a:lnRef>
-          <a:fillRef idx="3">
-            <a:schemeClr val="accent1"/>
+          <a:fillRef idx="2">
+            <a:schemeClr val="accent3"/>
           </a:fillRef>
-          <a:effectRef idx="2">
-            <a:schemeClr val="accent1"/>
+          <a:effectRef idx="1">
+            <a:schemeClr val="accent3"/>
           </a:effectRef>
           <a:fontRef idx="minor">
-            <a:schemeClr val="lt1"/>
+            <a:schemeClr val="dk1"/>
           </a:fontRef>
         </p:style>
         <p:txBody>
@@ -3331,8 +3359,12 @@
           <a:p>
             <a:pPr algn="ctr"/>
             <a:r>
+              <a:rPr lang="en-US" sz="1200" dirty="0"/>
+              <a:t>e</a:t>
+            </a:r>
+            <a:r>
               <a:rPr lang="en-US" sz="1200" dirty="0" smtClean="0"/>
-              <a:t>Easy-</a:t>
+              <a:t>asy-</a:t>
             </a:r>
             <a:r>
               <a:rPr lang="en-US" sz="1200" dirty="0" err="1" smtClean="0"/>
@@ -3478,7 +3510,7 @@
         <p:spPr>
           <a:xfrm>
             <a:off x="3650963" y="4406505"/>
-            <a:ext cx="950776" cy="1588"/>
+            <a:ext cx="950775" cy="1588"/>
           </a:xfrm>
           <a:prstGeom prst="line">
             <a:avLst/>
@@ -3583,8 +3615,8 @@
         </p:nvSpPr>
         <p:spPr>
           <a:xfrm>
-            <a:off x="5532080" y="2718934"/>
-            <a:ext cx="1749324" cy="734433"/>
+            <a:off x="5220431" y="2718934"/>
+            <a:ext cx="2540114" cy="734433"/>
           </a:xfrm>
           <a:prstGeom prst="ellipse">
             <a:avLst/>
@@ -3610,16 +3642,20 @@
           <a:p>
             <a:pPr algn="ctr"/>
             <a:r>
+              <a:rPr lang="en-US" sz="1200" dirty="0" err="1"/>
+              <a:t>n</a:t>
+            </a:r>
+            <a:r>
               <a:rPr lang="en-US" sz="1200" dirty="0" err="1" smtClean="0"/>
-              <a:t>EasySwordServer</a:t>
+              <a:t>l.dans.knaw.easy.sword</a:t>
             </a:r>
             <a:endParaRPr lang="en-US" sz="1200" dirty="0" smtClean="0"/>
           </a:p>
           <a:p>
             <a:pPr algn="ctr"/>
             <a:r>
-              <a:rPr lang="en-US" sz="1200" dirty="0" smtClean="0"/>
-              <a:t>.class</a:t>
+              <a:rPr lang="en-US" sz="1200" dirty="0" err="1" smtClean="0"/>
+              <a:t>EasySwordServer.class</a:t>
             </a:r>
             <a:endParaRPr lang="en-US" sz="1200" dirty="0"/>
           </a:p>
@@ -3633,8 +3669,8 @@
         </p:nvSpPr>
         <p:spPr>
           <a:xfrm>
-            <a:off x="4601739" y="4051717"/>
-            <a:ext cx="1439161" cy="712751"/>
+            <a:off x="4601738" y="4051717"/>
+            <a:ext cx="2482541" cy="712751"/>
           </a:xfrm>
           <a:prstGeom prst="ellipse">
             <a:avLst/>
@@ -3660,15 +3696,20 @@
           <a:p>
             <a:pPr algn="ctr"/>
             <a:r>
+              <a:rPr lang="en-US" sz="1200" dirty="0" err="1" smtClean="0"/>
+              <a:t>nl.dans.knaw.easy.sword</a:t>
+            </a:r>
+            <a:endParaRPr lang="en-US" sz="1200" dirty="0" smtClean="0"/>
+          </a:p>
+          <a:p>
+            <a:pPr algn="ctr"/>
+            <a:r>
               <a:rPr lang="en-US" sz="1200" dirty="0" smtClean="0"/>
-              <a:t>Easy*Facade</a:t>
-            </a:r>
-          </a:p>
-          <a:p>
-            <a:pPr algn="ctr"/>
-            <a:r>
-              <a:rPr lang="en-US" sz="1200" dirty="0" smtClean="0"/>
-              <a:t>.class</a:t>
+              <a:t>Easy*</a:t>
+            </a:r>
+            <a:r>
+              <a:rPr lang="en-US" sz="1200" dirty="0" err="1" smtClean="0"/>
+              <a:t>Facade.class</a:t>
             </a:r>
             <a:endParaRPr lang="en-US" sz="1200" dirty="0"/>
           </a:p>
@@ -3710,8 +3751,20 @@
             <a:pPr algn="ctr"/>
             <a:r>
               <a:rPr lang="en-US" sz="1200" dirty="0" smtClean="0"/>
-              <a:t>Sword-common-1-1.jar</a:t>
-            </a:r>
+              <a:t>sword-common-1-1.jar</a:t>
+            </a:r>
+          </a:p>
+          <a:p>
+            <a:pPr algn="ctr"/>
+            <a:endParaRPr lang="en-US" sz="1200" dirty="0" smtClean="0"/>
+          </a:p>
+          <a:p>
+            <a:pPr algn="ctr"/>
+            <a:r>
+              <a:rPr lang="en-US" sz="1200" dirty="0" err="1"/>
+              <a:t>org.purl.sword.client</a:t>
+            </a:r>
+            <a:endParaRPr lang="en-US" sz="1200" dirty="0" smtClean="0"/>
           </a:p>
           <a:p>
             <a:pPr algn="ctr"/>
@@ -4039,8 +4092,8 @@
         </p:nvSpPr>
         <p:spPr>
           <a:xfrm>
-            <a:off x="6040900" y="4806272"/>
-            <a:ext cx="1379243" cy="573580"/>
+            <a:off x="4601738" y="5116653"/>
+            <a:ext cx="2919481" cy="573580"/>
           </a:xfrm>
           <a:prstGeom prst="ellipse">
             <a:avLst/>
@@ -4067,15 +4120,15 @@
             <a:pPr algn="ctr"/>
             <a:r>
               <a:rPr lang="en-US" sz="1200" dirty="0" err="1" smtClean="0"/>
-              <a:t>UnzipResult</a:t>
+              <a:t>nl.dans.knaw.easy.sword</a:t>
             </a:r>
             <a:endParaRPr lang="en-US" sz="1200" dirty="0" smtClean="0"/>
           </a:p>
           <a:p>
             <a:pPr algn="ctr"/>
             <a:r>
-              <a:rPr lang="en-US" sz="1200" dirty="0" smtClean="0"/>
-              <a:t>.class</a:t>
+              <a:rPr lang="en-US" sz="1200" dirty="0" err="1" smtClean="0"/>
+              <a:t>Payload.class</a:t>
             </a:r>
             <a:endParaRPr lang="en-US" sz="1200" dirty="0"/>
           </a:p>
@@ -4091,9 +4144,9 @@
           <p:nvPr/>
         </p:nvCxnSpPr>
         <p:spPr>
-          <a:xfrm rot="10800000" flipV="1">
-            <a:off x="3967294" y="5093062"/>
-            <a:ext cx="2073606" cy="298586"/>
+          <a:xfrm rot="10800000">
+            <a:off x="3967294" y="5391649"/>
+            <a:ext cx="634444" cy="11795"/>
           </a:xfrm>
           <a:prstGeom prst="straightConnector1">
             <a:avLst/>
@@ -4127,9 +4180,9 @@
           <p:nvPr/>
         </p:nvCxnSpPr>
         <p:spPr>
-          <a:xfrm rot="16200000" flipH="1">
-            <a:off x="6349460" y="4021572"/>
-            <a:ext cx="1544459" cy="192937"/>
+          <a:xfrm rot="5400000">
+            <a:off x="6313693" y="4125791"/>
+            <a:ext cx="1854840" cy="294883"/>
           </a:xfrm>
           <a:prstGeom prst="straightConnector1">
             <a:avLst/>
@@ -4158,14 +4211,14 @@
           <p:cNvPr id="136" name="Straight Arrow Connector 135"/>
           <p:cNvCxnSpPr>
             <a:stCxn id="73" idx="3"/>
-            <a:endCxn id="76" idx="0"/>
+            <a:endCxn id="76" idx="1"/>
           </p:cNvCxnSpPr>
           <p:nvPr/>
         </p:nvCxnSpPr>
         <p:spPr>
           <a:xfrm rot="5400000">
-            <a:off x="5201840" y="3465293"/>
-            <a:ext cx="705905" cy="466943"/>
+            <a:off x="4873718" y="3437392"/>
+            <a:ext cx="810285" cy="627124"/>
           </a:xfrm>
           <a:prstGeom prst="straightConnector1">
             <a:avLst/>
@@ -4193,15 +4246,15 @@
         <p:nvCxnSpPr>
           <p:cNvPr id="217" name="Straight Arrow Connector 216"/>
           <p:cNvCxnSpPr>
-            <a:stCxn id="76" idx="5"/>
-            <a:endCxn id="125" idx="1"/>
+            <a:stCxn id="76" idx="4"/>
+            <a:endCxn id="125" idx="0"/>
           </p:cNvCxnSpPr>
           <p:nvPr/>
         </p:nvCxnSpPr>
         <p:spPr>
           <a:xfrm rot="16200000" flipH="1">
-            <a:off x="5921421" y="4568806"/>
-            <a:ext cx="230183" cy="412745"/>
+            <a:off x="5776152" y="4831325"/>
+            <a:ext cx="352185" cy="218470"/>
           </a:xfrm>
           <a:prstGeom prst="straightConnector1">
             <a:avLst/>
@@ -4321,8 +4374,8 @@
         </p:nvCxnSpPr>
         <p:spPr>
           <a:xfrm rot="5400000">
-            <a:off x="4588339" y="4550689"/>
-            <a:ext cx="909383" cy="2399711"/>
+            <a:off x="4136729" y="5312679"/>
+            <a:ext cx="599002" cy="1186112"/>
           </a:xfrm>
           <a:prstGeom prst="straightConnector1">
             <a:avLst/>
@@ -4460,6 +4513,83 @@
           </a:fontRef>
         </p:style>
       </p:cxnSp>
+      <p:sp>
+        <p:nvSpPr>
+          <p:cNvPr id="312" name="Line Callout 1 311"/>
+          <p:cNvSpPr/>
+          <p:nvPr/>
+        </p:nvSpPr>
+        <p:spPr>
+          <a:xfrm>
+            <a:off x="3388526" y="333613"/>
+            <a:ext cx="4891588" cy="824650"/>
+          </a:xfrm>
+          <a:prstGeom prst="borderCallout1">
+            <a:avLst>
+              <a:gd name="adj1" fmla="val 53190"/>
+              <a:gd name="adj2" fmla="val -623"/>
+              <a:gd name="adj3" fmla="val 94588"/>
+              <a:gd name="adj4" fmla="val -14395"/>
+            </a:avLst>
+          </a:prstGeom>
+        </p:spPr>
+        <p:style>
+          <a:lnRef idx="2">
+            <a:schemeClr val="accent1"/>
+          </a:lnRef>
+          <a:fillRef idx="1">
+            <a:schemeClr val="lt1"/>
+          </a:fillRef>
+          <a:effectRef idx="0">
+            <a:schemeClr val="accent1"/>
+          </a:effectRef>
+          <a:fontRef idx="minor">
+            <a:schemeClr val="dk1"/>
+          </a:fontRef>
+        </p:style>
+        <p:txBody>
+          <a:bodyPr rtlCol="0" anchor="ctr"/>
+          <a:lstStyle/>
+          <a:p>
+            <a:r>
+              <a:rPr lang="en-US" sz="1200" dirty="0" smtClean="0">
+                <a:hlinkClick r:id="rId2"/>
+              </a:rPr>
+              <a:t>http://Apps.facebook.com/swordapp</a:t>
+            </a:r>
+            <a:endParaRPr lang="en-US" sz="1200" dirty="0" smtClean="0"/>
+          </a:p>
+          <a:p>
+            <a:r>
+              <a:rPr lang="en-US" sz="1200" dirty="0" smtClean="0"/>
+              <a:t>PHP client: </a:t>
+            </a:r>
+            <a:r>
+              <a:rPr lang="en-US" sz="1200" dirty="0" smtClean="0">
+                <a:hlinkClick r:id="rId3"/>
+              </a:rPr>
+              <a:t>http://easydeposit.swordapp.org/instructions/</a:t>
+            </a:r>
+            <a:endParaRPr lang="en-US" sz="1200" dirty="0" smtClean="0"/>
+          </a:p>
+          <a:p>
+            <a:r>
+              <a:rPr lang="en-US" sz="1200" dirty="0" smtClean="0"/>
+              <a:t>More: </a:t>
+            </a:r>
+            <a:r>
+              <a:rPr lang="en-US" sz="1200" dirty="0" smtClean="0">
+                <a:hlinkClick r:id="rId4"/>
+              </a:rPr>
+              <a:t>http://www.slideshare.net/swordapp/module-4-sword-clients</a:t>
+            </a:r>
+            <a:r>
+              <a:rPr lang="en-US" sz="1200" dirty="0" smtClean="0"/>
+              <a:t> 	</a:t>
+            </a:r>
+          </a:p>
+        </p:txBody>
+      </p:sp>
     </p:spTree>
   </p:cSld>
   <p:clrMapOvr>

</xml_diff>

<commit_message>
proper location for the collection
git-svn-id: svn+ssh://develop01.dans.knaw.nl/development/svn/repos/mixed/easy-sword/trunk@10894 a75a9a65-0d41-4860-8c96-5fae3ec79aa9
</commit_message>
<xml_diff>
--- a/doc/overview.pptx
+++ b/doc/overview.pptx
@@ -288,7 +288,8 @@
           <a:p>
             <a:fld id="{64F2D27B-4C84-BD47-81A2-1F67C3F43376}" type="datetimeFigureOut">
               <a:rPr lang="en-US" smtClean="0"/>
-              <a:t>4/27/12</a:t>
+              <a:pPr/>
+              <a:t>5/7/12</a:t>
             </a:fld>
             <a:endParaRPr lang="en-US"/>
           </a:p>
@@ -330,6 +331,7 @@
           <a:p>
             <a:fld id="{82D167B5-C6E1-3644-B78A-05102D61F33E}" type="slidenum">
               <a:rPr lang="en-US" smtClean="0"/>
+              <a:pPr/>
               <a:t>‹#›</a:t>
             </a:fld>
             <a:endParaRPr lang="en-US"/>
@@ -453,7 +455,8 @@
           <a:p>
             <a:fld id="{64F2D27B-4C84-BD47-81A2-1F67C3F43376}" type="datetimeFigureOut">
               <a:rPr lang="en-US" smtClean="0"/>
-              <a:t>4/27/12</a:t>
+              <a:pPr/>
+              <a:t>5/7/12</a:t>
             </a:fld>
             <a:endParaRPr lang="en-US"/>
           </a:p>
@@ -495,6 +498,7 @@
           <a:p>
             <a:fld id="{82D167B5-C6E1-3644-B78A-05102D61F33E}" type="slidenum">
               <a:rPr lang="en-US" smtClean="0"/>
+              <a:pPr/>
               <a:t>‹#›</a:t>
             </a:fld>
             <a:endParaRPr lang="en-US"/>
@@ -628,7 +632,8 @@
           <a:p>
             <a:fld id="{64F2D27B-4C84-BD47-81A2-1F67C3F43376}" type="datetimeFigureOut">
               <a:rPr lang="en-US" smtClean="0"/>
-              <a:t>4/27/12</a:t>
+              <a:pPr/>
+              <a:t>5/7/12</a:t>
             </a:fld>
             <a:endParaRPr lang="en-US"/>
           </a:p>
@@ -670,6 +675,7 @@
           <a:p>
             <a:fld id="{82D167B5-C6E1-3644-B78A-05102D61F33E}" type="slidenum">
               <a:rPr lang="en-US" smtClean="0"/>
+              <a:pPr/>
               <a:t>‹#›</a:t>
             </a:fld>
             <a:endParaRPr lang="en-US"/>
@@ -793,7 +799,8 @@
           <a:p>
             <a:fld id="{64F2D27B-4C84-BD47-81A2-1F67C3F43376}" type="datetimeFigureOut">
               <a:rPr lang="en-US" smtClean="0"/>
-              <a:t>4/27/12</a:t>
+              <a:pPr/>
+              <a:t>5/7/12</a:t>
             </a:fld>
             <a:endParaRPr lang="en-US"/>
           </a:p>
@@ -835,6 +842,7 @@
           <a:p>
             <a:fld id="{82D167B5-C6E1-3644-B78A-05102D61F33E}" type="slidenum">
               <a:rPr lang="en-US" smtClean="0"/>
+              <a:pPr/>
               <a:t>‹#›</a:t>
             </a:fld>
             <a:endParaRPr lang="en-US"/>
@@ -1034,7 +1042,8 @@
           <a:p>
             <a:fld id="{64F2D27B-4C84-BD47-81A2-1F67C3F43376}" type="datetimeFigureOut">
               <a:rPr lang="en-US" smtClean="0"/>
-              <a:t>4/27/12</a:t>
+              <a:pPr/>
+              <a:t>5/7/12</a:t>
             </a:fld>
             <a:endParaRPr lang="en-US"/>
           </a:p>
@@ -1076,6 +1085,7 @@
           <a:p>
             <a:fld id="{82D167B5-C6E1-3644-B78A-05102D61F33E}" type="slidenum">
               <a:rPr lang="en-US" smtClean="0"/>
+              <a:pPr/>
               <a:t>‹#›</a:t>
             </a:fld>
             <a:endParaRPr lang="en-US"/>
@@ -1317,7 +1327,8 @@
           <a:p>
             <a:fld id="{64F2D27B-4C84-BD47-81A2-1F67C3F43376}" type="datetimeFigureOut">
               <a:rPr lang="en-US" smtClean="0"/>
-              <a:t>4/27/12</a:t>
+              <a:pPr/>
+              <a:t>5/7/12</a:t>
             </a:fld>
             <a:endParaRPr lang="en-US"/>
           </a:p>
@@ -1359,6 +1370,7 @@
           <a:p>
             <a:fld id="{82D167B5-C6E1-3644-B78A-05102D61F33E}" type="slidenum">
               <a:rPr lang="en-US" smtClean="0"/>
+              <a:pPr/>
               <a:t>‹#›</a:t>
             </a:fld>
             <a:endParaRPr lang="en-US"/>
@@ -1734,7 +1746,8 @@
           <a:p>
             <a:fld id="{64F2D27B-4C84-BD47-81A2-1F67C3F43376}" type="datetimeFigureOut">
               <a:rPr lang="en-US" smtClean="0"/>
-              <a:t>4/27/12</a:t>
+              <a:pPr/>
+              <a:t>5/7/12</a:t>
             </a:fld>
             <a:endParaRPr lang="en-US"/>
           </a:p>
@@ -1776,6 +1789,7 @@
           <a:p>
             <a:fld id="{82D167B5-C6E1-3644-B78A-05102D61F33E}" type="slidenum">
               <a:rPr lang="en-US" smtClean="0"/>
+              <a:pPr/>
               <a:t>‹#›</a:t>
             </a:fld>
             <a:endParaRPr lang="en-US"/>
@@ -1847,7 +1861,8 @@
           <a:p>
             <a:fld id="{64F2D27B-4C84-BD47-81A2-1F67C3F43376}" type="datetimeFigureOut">
               <a:rPr lang="en-US" smtClean="0"/>
-              <a:t>4/27/12</a:t>
+              <a:pPr/>
+              <a:t>5/7/12</a:t>
             </a:fld>
             <a:endParaRPr lang="en-US"/>
           </a:p>
@@ -1889,6 +1904,7 @@
           <a:p>
             <a:fld id="{82D167B5-C6E1-3644-B78A-05102D61F33E}" type="slidenum">
               <a:rPr lang="en-US" smtClean="0"/>
+              <a:pPr/>
               <a:t>‹#›</a:t>
             </a:fld>
             <a:endParaRPr lang="en-US"/>
@@ -1937,7 +1953,8 @@
           <a:p>
             <a:fld id="{64F2D27B-4C84-BD47-81A2-1F67C3F43376}" type="datetimeFigureOut">
               <a:rPr lang="en-US" smtClean="0"/>
-              <a:t>4/27/12</a:t>
+              <a:pPr/>
+              <a:t>5/7/12</a:t>
             </a:fld>
             <a:endParaRPr lang="en-US"/>
           </a:p>
@@ -1979,6 +1996,7 @@
           <a:p>
             <a:fld id="{82D167B5-C6E1-3644-B78A-05102D61F33E}" type="slidenum">
               <a:rPr lang="en-US" smtClean="0"/>
+              <a:pPr/>
               <a:t>‹#›</a:t>
             </a:fld>
             <a:endParaRPr lang="en-US"/>
@@ -2209,7 +2227,8 @@
           <a:p>
             <a:fld id="{64F2D27B-4C84-BD47-81A2-1F67C3F43376}" type="datetimeFigureOut">
               <a:rPr lang="en-US" smtClean="0"/>
-              <a:t>4/27/12</a:t>
+              <a:pPr/>
+              <a:t>5/7/12</a:t>
             </a:fld>
             <a:endParaRPr lang="en-US"/>
           </a:p>
@@ -2251,6 +2270,7 @@
           <a:p>
             <a:fld id="{82D167B5-C6E1-3644-B78A-05102D61F33E}" type="slidenum">
               <a:rPr lang="en-US" smtClean="0"/>
+              <a:pPr/>
               <a:t>‹#›</a:t>
             </a:fld>
             <a:endParaRPr lang="en-US"/>
@@ -2457,7 +2477,8 @@
           <a:p>
             <a:fld id="{64F2D27B-4C84-BD47-81A2-1F67C3F43376}" type="datetimeFigureOut">
               <a:rPr lang="en-US" smtClean="0"/>
-              <a:t>4/27/12</a:t>
+              <a:pPr/>
+              <a:t>5/7/12</a:t>
             </a:fld>
             <a:endParaRPr lang="en-US"/>
           </a:p>
@@ -2499,6 +2520,7 @@
           <a:p>
             <a:fld id="{82D167B5-C6E1-3644-B78A-05102D61F33E}" type="slidenum">
               <a:rPr lang="en-US" smtClean="0"/>
+              <a:pPr/>
               <a:t>‹#›</a:t>
             </a:fld>
             <a:endParaRPr lang="en-US"/>
@@ -2665,7 +2687,8 @@
           <a:p>
             <a:fld id="{64F2D27B-4C84-BD47-81A2-1F67C3F43376}" type="datetimeFigureOut">
               <a:rPr lang="en-US" smtClean="0"/>
-              <a:t>4/27/12</a:t>
+              <a:pPr/>
+              <a:t>5/7/12</a:t>
             </a:fld>
             <a:endParaRPr lang="en-US"/>
           </a:p>
@@ -2743,6 +2766,7 @@
           <a:p>
             <a:fld id="{82D167B5-C6E1-3644-B78A-05102D61F33E}" type="slidenum">
               <a:rPr lang="en-US" smtClean="0"/>
+              <a:pPr/>
               <a:t>‹#›</a:t>
             </a:fld>
             <a:endParaRPr lang="en-US"/>
@@ -3037,13 +3061,115 @@
       </p:grpSpPr>
       <p:sp>
         <p:nvSpPr>
+          <p:cNvPr id="53" name="TextBox 52"/>
+          <p:cNvSpPr txBox="1"/>
+          <p:nvPr/>
+        </p:nvSpPr>
+        <p:spPr>
+          <a:xfrm>
+            <a:off x="7642533" y="333613"/>
+            <a:ext cx="1224070" cy="1015663"/>
+          </a:xfrm>
+          <a:prstGeom prst="rect">
+            <a:avLst/>
+          </a:prstGeom>
+          <a:noFill/>
+          <a:ln>
+            <a:solidFill>
+              <a:srgbClr val="3366FF"/>
+            </a:solidFill>
+          </a:ln>
+        </p:spPr>
+        <p:txBody>
+          <a:bodyPr wrap="square" rtlCol="0">
+            <a:spAutoFit/>
+          </a:bodyPr>
+          <a:lstStyle/>
+          <a:p>
+            <a:r>
+              <a:rPr lang="en-US" sz="1200" dirty="0" smtClean="0"/>
+              <a:t>Legend:</a:t>
+            </a:r>
+          </a:p>
+          <a:p>
+            <a:r>
+              <a:rPr lang="en-US" sz="1200" dirty="0" smtClean="0"/>
+              <a:t>Data flow</a:t>
+            </a:r>
+          </a:p>
+          <a:p>
+            <a:endParaRPr lang="en-US" sz="1200" dirty="0" smtClean="0"/>
+          </a:p>
+          <a:p>
+            <a:r>
+              <a:rPr lang="en-US" sz="1200" dirty="0" smtClean="0"/>
+              <a:t>dependency</a:t>
+            </a:r>
+          </a:p>
+          <a:p>
+            <a:endParaRPr lang="en-US" sz="1200" dirty="0"/>
+          </a:p>
+        </p:txBody>
+      </p:sp>
+      <p:sp>
+        <p:nvSpPr>
+          <p:cNvPr id="48" name="Rounded Rectangle 47"/>
+          <p:cNvSpPr/>
+          <p:nvPr/>
+        </p:nvSpPr>
+        <p:spPr>
+          <a:xfrm>
+            <a:off x="3771947" y="2020347"/>
+            <a:ext cx="3653388" cy="4651076"/>
+          </a:xfrm>
+          <a:prstGeom prst="roundRect">
+            <a:avLst/>
+          </a:prstGeom>
+        </p:spPr>
+        <p:style>
+          <a:lnRef idx="1">
+            <a:schemeClr val="accent3"/>
+          </a:lnRef>
+          <a:fillRef idx="2">
+            <a:schemeClr val="accent3"/>
+          </a:fillRef>
+          <a:effectRef idx="1">
+            <a:schemeClr val="accent3"/>
+          </a:effectRef>
+          <a:fontRef idx="minor">
+            <a:schemeClr val="dk1"/>
+          </a:fontRef>
+        </p:style>
+        <p:txBody>
+          <a:bodyPr rtlCol="0" anchor="t" anchorCtr="0"/>
+          <a:lstStyle/>
+          <a:p>
+            <a:pPr algn="ctr"/>
+            <a:r>
+              <a:rPr lang="en-US" sz="1200" dirty="0"/>
+              <a:t>e</a:t>
+            </a:r>
+            <a:r>
+              <a:rPr lang="en-US" sz="1200" dirty="0" smtClean="0"/>
+              <a:t>asy-</a:t>
+            </a:r>
+            <a:r>
+              <a:rPr lang="en-US" sz="1200" dirty="0" err="1" smtClean="0"/>
+              <a:t>sword.jar</a:t>
+            </a:r>
+            <a:endParaRPr lang="en-US" sz="1200" dirty="0"/>
+          </a:p>
+        </p:txBody>
+      </p:sp>
+      <p:sp>
+        <p:nvSpPr>
           <p:cNvPr id="263" name="Rounded Rectangle 262"/>
           <p:cNvSpPr/>
           <p:nvPr/>
         </p:nvSpPr>
         <p:spPr>
           <a:xfrm>
-            <a:off x="845120" y="638413"/>
+            <a:off x="636460" y="638413"/>
             <a:ext cx="1834990" cy="964384"/>
           </a:xfrm>
           <a:prstGeom prst="roundRect">
@@ -3092,7 +3218,7 @@
         </p:nvSpPr>
         <p:spPr>
           <a:xfrm>
-            <a:off x="692720" y="486013"/>
+            <a:off x="484060" y="486013"/>
             <a:ext cx="1834990" cy="964384"/>
           </a:xfrm>
           <a:prstGeom prst="roundRect">
@@ -3133,80 +3259,19 @@
           </a:p>
         </p:txBody>
       </p:sp>
-      <p:sp>
-        <p:nvSpPr>
-          <p:cNvPr id="78" name="Cloud 77"/>
-          <p:cNvSpPr/>
-          <p:nvPr/>
-        </p:nvSpPr>
-        <p:spPr>
-          <a:xfrm>
-            <a:off x="4204184" y="1613739"/>
-            <a:ext cx="4441710" cy="5018360"/>
-          </a:xfrm>
-          <a:prstGeom prst="cloud">
-            <a:avLst/>
-          </a:prstGeom>
-        </p:spPr>
-        <p:style>
-          <a:lnRef idx="1">
-            <a:schemeClr val="accent3"/>
-          </a:lnRef>
-          <a:fillRef idx="2">
-            <a:schemeClr val="accent3"/>
-          </a:fillRef>
-          <a:effectRef idx="1">
-            <a:schemeClr val="accent3"/>
-          </a:effectRef>
-          <a:fontRef idx="minor">
-            <a:schemeClr val="dk1"/>
-          </a:fontRef>
-        </p:style>
-        <p:txBody>
-          <a:bodyPr rtlCol="0" anchor="ctr"/>
-          <a:lstStyle/>
-          <a:p>
-            <a:pPr algn="ctr"/>
-            <a:endParaRPr lang="en-US" dirty="0" smtClean="0"/>
-          </a:p>
-          <a:p>
-            <a:pPr algn="ctr"/>
-            <a:r>
-              <a:rPr lang="en-US" dirty="0" smtClean="0"/>
-              <a:t>easy-</a:t>
-            </a:r>
-            <a:r>
-              <a:rPr lang="en-US" dirty="0" err="1" smtClean="0"/>
-              <a:t>sword.jar</a:t>
-            </a:r>
-            <a:endParaRPr lang="en-US" dirty="0" smtClean="0"/>
-          </a:p>
-          <a:p>
-            <a:pPr algn="ctr"/>
-            <a:endParaRPr lang="en-US" dirty="0" smtClean="0"/>
-          </a:p>
-          <a:p>
-            <a:pPr algn="ctr"/>
-            <a:endParaRPr lang="en-US" dirty="0" smtClean="0"/>
-          </a:p>
-          <a:p>
-            <a:pPr algn="ctr"/>
-            <a:endParaRPr lang="en-US" dirty="0"/>
-          </a:p>
-        </p:txBody>
-      </p:sp>
       <p:cxnSp>
         <p:nvCxnSpPr>
           <p:cNvPr id="7" name="Straight Connector 6"/>
           <p:cNvCxnSpPr>
+            <a:stCxn id="59" idx="1"/>
             <a:endCxn id="15" idx="3"/>
           </p:cNvCxnSpPr>
           <p:nvPr/>
         </p:nvCxnSpPr>
         <p:spPr>
           <a:xfrm rot="10800000">
-            <a:off x="2375308" y="3119084"/>
-            <a:ext cx="689804" cy="1588"/>
+            <a:off x="2166649" y="3119084"/>
+            <a:ext cx="404903" cy="1588"/>
           </a:xfrm>
           <a:prstGeom prst="line">
             <a:avLst/>
@@ -3235,7 +3300,7 @@
         </p:nvSpPr>
         <p:spPr>
           <a:xfrm>
-            <a:off x="540318" y="2636892"/>
+            <a:off x="331658" y="2636892"/>
             <a:ext cx="1834990" cy="964384"/>
           </a:xfrm>
           <a:prstGeom prst="roundRect">
@@ -3296,14 +3361,15 @@
         <p:nvCxnSpPr>
           <p:cNvPr id="30" name="Straight Connector 29"/>
           <p:cNvCxnSpPr>
+            <a:stCxn id="5" idx="0"/>
             <a:endCxn id="73" idx="2"/>
           </p:cNvCxnSpPr>
           <p:nvPr/>
         </p:nvCxnSpPr>
         <p:spPr>
           <a:xfrm flipV="1">
-            <a:off x="3654344" y="3086151"/>
-            <a:ext cx="1566087" cy="32936"/>
+            <a:off x="3160783" y="3094351"/>
+            <a:ext cx="1534842" cy="24735"/>
           </a:xfrm>
           <a:prstGeom prst="line">
             <a:avLst/>
@@ -3332,7 +3398,7 @@
         </p:nvSpPr>
         <p:spPr>
           <a:xfrm>
-            <a:off x="540321" y="3910338"/>
+            <a:off x="331661" y="3910338"/>
             <a:ext cx="1834986" cy="964384"/>
           </a:xfrm>
           <a:prstGeom prst="roundRect">
@@ -3368,7 +3434,7 @@
             </a:r>
             <a:r>
               <a:rPr lang="en-US" sz="1200" dirty="0" err="1" smtClean="0"/>
-              <a:t>bussiness.jar</a:t>
+              <a:t>business.jar</a:t>
             </a:r>
             <a:endParaRPr lang="en-US" sz="1200" dirty="0"/>
           </a:p>
@@ -3382,7 +3448,7 @@
         </p:nvGrpSpPr>
         <p:grpSpPr>
           <a:xfrm>
-            <a:off x="3065112" y="2849399"/>
+            <a:off x="2571551" y="2849399"/>
             <a:ext cx="589232" cy="539369"/>
             <a:chOff x="2458654" y="2746238"/>
             <a:chExt cx="589232" cy="539369"/>
@@ -3476,8 +3542,8 @@
         </p:nvCxnSpPr>
         <p:spPr>
           <a:xfrm rot="10800000" flipV="1">
-            <a:off x="2375307" y="4392528"/>
-            <a:ext cx="686590" cy="1"/>
+            <a:off x="2166648" y="4233984"/>
+            <a:ext cx="411245" cy="158545"/>
           </a:xfrm>
           <a:prstGeom prst="line">
             <a:avLst/>
@@ -3508,9 +3574,9 @@
           <p:nvPr/>
         </p:nvCxnSpPr>
         <p:spPr>
-          <a:xfrm>
-            <a:off x="3650963" y="4406505"/>
-            <a:ext cx="950775" cy="1588"/>
+          <a:xfrm flipV="1">
+            <a:off x="3166958" y="4069702"/>
+            <a:ext cx="920161" cy="178259"/>
           </a:xfrm>
           <a:prstGeom prst="line">
             <a:avLst/>
@@ -3531,16 +3597,107 @@
           </a:fontRef>
         </p:style>
       </p:cxnSp>
-      <p:sp>
-        <p:nvSpPr>
-          <p:cNvPr id="68" name="Oval 67"/>
+      <p:grpSp>
+        <p:nvGrpSpPr>
+          <p:cNvPr id="78" name="Group 77"/>
+          <p:cNvGrpSpPr/>
+          <p:nvPr/>
+        </p:nvGrpSpPr>
+        <p:grpSpPr>
+          <a:xfrm>
+            <a:off x="2577826" y="3969904"/>
+            <a:ext cx="589165" cy="539369"/>
+            <a:chOff x="2550019" y="4022178"/>
+            <a:chExt cx="589165" cy="539369"/>
+          </a:xfrm>
+        </p:grpSpPr>
+        <p:sp>
+          <p:nvSpPr>
+            <p:cNvPr id="68" name="Oval 67"/>
+            <p:cNvSpPr/>
+            <p:nvPr/>
+          </p:nvSpPr>
+          <p:spPr>
+            <a:xfrm rot="5481548">
+              <a:off x="2880009" y="4180770"/>
+              <a:ext cx="284955" cy="233394"/>
+            </a:xfrm>
+            <a:prstGeom prst="ellipse">
+              <a:avLst/>
+            </a:prstGeom>
+          </p:spPr>
+          <p:style>
+            <a:lnRef idx="1">
+              <a:schemeClr val="accent1"/>
+            </a:lnRef>
+            <a:fillRef idx="3">
+              <a:schemeClr val="accent1"/>
+            </a:fillRef>
+            <a:effectRef idx="2">
+              <a:schemeClr val="accent1"/>
+            </a:effectRef>
+            <a:fontRef idx="minor">
+              <a:schemeClr val="lt1"/>
+            </a:fontRef>
+          </p:style>
+          <p:txBody>
+            <a:bodyPr rtlCol="0" anchor="ctr"/>
+            <a:lstStyle/>
+            <a:p>
+              <a:pPr algn="ctr"/>
+              <a:endParaRPr lang="en-US"/>
+            </a:p>
+          </p:txBody>
+        </p:sp>
+        <p:sp>
+          <p:nvSpPr>
+            <p:cNvPr id="70" name="Moon 69"/>
+            <p:cNvSpPr/>
+            <p:nvPr/>
+          </p:nvSpPr>
+          <p:spPr>
+            <a:xfrm rot="81548">
+              <a:off x="2550019" y="4022178"/>
+              <a:ext cx="472535" cy="539369"/>
+            </a:xfrm>
+            <a:prstGeom prst="moon">
+              <a:avLst/>
+            </a:prstGeom>
+          </p:spPr>
+          <p:style>
+            <a:lnRef idx="1">
+              <a:schemeClr val="accent1"/>
+            </a:lnRef>
+            <a:fillRef idx="3">
+              <a:schemeClr val="accent1"/>
+            </a:fillRef>
+            <a:effectRef idx="2">
+              <a:schemeClr val="accent1"/>
+            </a:effectRef>
+            <a:fontRef idx="minor">
+              <a:schemeClr val="lt1"/>
+            </a:fontRef>
+          </p:style>
+          <p:txBody>
+            <a:bodyPr rtlCol="0" anchor="ctr"/>
+            <a:lstStyle/>
+            <a:p>
+              <a:pPr algn="ctr"/>
+              <a:endParaRPr lang="en-US"/>
+            </a:p>
+          </p:txBody>
+        </p:sp>
+      </p:grpSp>
+      <p:sp>
+        <p:nvSpPr>
+          <p:cNvPr id="73" name="Oval 72"/>
           <p:cNvSpPr/>
           <p:nvPr/>
         </p:nvSpPr>
         <p:spPr>
-          <a:xfrm rot="5481548">
-            <a:off x="3391821" y="4287040"/>
-            <a:ext cx="284955" cy="233394"/>
+          <a:xfrm>
+            <a:off x="4695625" y="2727134"/>
+            <a:ext cx="2540114" cy="734433"/>
           </a:xfrm>
           <a:prstGeom prst="ellipse">
             <a:avLst/>
@@ -3565,22 +3722,38 @@
           <a:lstStyle/>
           <a:p>
             <a:pPr algn="ctr"/>
-            <a:endParaRPr lang="en-US"/>
-          </a:p>
-        </p:txBody>
-      </p:sp>
-      <p:sp>
-        <p:nvSpPr>
-          <p:cNvPr id="70" name="Moon 69"/>
+            <a:r>
+              <a:rPr lang="en-US" sz="1200" dirty="0" err="1"/>
+              <a:t>n</a:t>
+            </a:r>
+            <a:r>
+              <a:rPr lang="en-US" sz="1200" dirty="0" err="1" smtClean="0"/>
+              <a:t>l.dans.knaw.easy.sword</a:t>
+            </a:r>
+            <a:endParaRPr lang="en-US" sz="1200" dirty="0" smtClean="0"/>
+          </a:p>
+          <a:p>
+            <a:pPr algn="ctr"/>
+            <a:r>
+              <a:rPr lang="en-US" sz="1200" dirty="0" err="1" smtClean="0"/>
+              <a:t>EasySwordServer.class</a:t>
+            </a:r>
+            <a:endParaRPr lang="en-US" sz="1200" dirty="0"/>
+          </a:p>
+        </p:txBody>
+      </p:sp>
+      <p:sp>
+        <p:nvSpPr>
+          <p:cNvPr id="76" name="Oval 75"/>
           <p:cNvSpPr/>
           <p:nvPr/>
         </p:nvSpPr>
         <p:spPr>
-          <a:xfrm rot="81548">
-            <a:off x="3061831" y="4128448"/>
-            <a:ext cx="472535" cy="539369"/>
-          </a:xfrm>
-          <a:prstGeom prst="moon">
+          <a:xfrm>
+            <a:off x="4087119" y="3713326"/>
+            <a:ext cx="2482541" cy="712751"/>
+          </a:xfrm>
+          <a:prstGeom prst="ellipse">
             <a:avLst/>
           </a:prstGeom>
         </p:spPr>
@@ -3603,22 +3776,38 @@
           <a:lstStyle/>
           <a:p>
             <a:pPr algn="ctr"/>
-            <a:endParaRPr lang="en-US"/>
-          </a:p>
-        </p:txBody>
-      </p:sp>
-      <p:sp>
-        <p:nvSpPr>
-          <p:cNvPr id="73" name="Oval 72"/>
+            <a:r>
+              <a:rPr lang="en-US" sz="1200" dirty="0" err="1" smtClean="0"/>
+              <a:t>nl.dans.knaw.easy.sword</a:t>
+            </a:r>
+            <a:endParaRPr lang="en-US" sz="1200" dirty="0" smtClean="0"/>
+          </a:p>
+          <a:p>
+            <a:pPr algn="ctr"/>
+            <a:r>
+              <a:rPr lang="en-US" sz="1200" dirty="0" smtClean="0"/>
+              <a:t>Easy*</a:t>
+            </a:r>
+            <a:r>
+              <a:rPr lang="en-US" sz="1200" dirty="0" err="1" smtClean="0"/>
+              <a:t>Facade.class</a:t>
+            </a:r>
+            <a:endParaRPr lang="en-US" sz="1200" dirty="0"/>
+          </a:p>
+        </p:txBody>
+      </p:sp>
+      <p:sp>
+        <p:nvSpPr>
+          <p:cNvPr id="98" name="Rounded Rectangle 97"/>
           <p:cNvSpPr/>
           <p:nvPr/>
         </p:nvSpPr>
         <p:spPr>
           <a:xfrm>
-            <a:off x="5220431" y="2718934"/>
-            <a:ext cx="2540114" cy="734433"/>
-          </a:xfrm>
-          <a:prstGeom prst="ellipse">
+            <a:off x="331660" y="333613"/>
+            <a:ext cx="1834990" cy="964384"/>
+          </a:xfrm>
+          <a:prstGeom prst="roundRect">
             <a:avLst/>
           </a:prstGeom>
         </p:spPr>
@@ -3642,114 +3831,6 @@
           <a:p>
             <a:pPr algn="ctr"/>
             <a:r>
-              <a:rPr lang="en-US" sz="1200" dirty="0" err="1"/>
-              <a:t>n</a:t>
-            </a:r>
-            <a:r>
-              <a:rPr lang="en-US" sz="1200" dirty="0" err="1" smtClean="0"/>
-              <a:t>l.dans.knaw.easy.sword</a:t>
-            </a:r>
-            <a:endParaRPr lang="en-US" sz="1200" dirty="0" smtClean="0"/>
-          </a:p>
-          <a:p>
-            <a:pPr algn="ctr"/>
-            <a:r>
-              <a:rPr lang="en-US" sz="1200" dirty="0" err="1" smtClean="0"/>
-              <a:t>EasySwordServer.class</a:t>
-            </a:r>
-            <a:endParaRPr lang="en-US" sz="1200" dirty="0"/>
-          </a:p>
-        </p:txBody>
-      </p:sp>
-      <p:sp>
-        <p:nvSpPr>
-          <p:cNvPr id="76" name="Oval 75"/>
-          <p:cNvSpPr/>
-          <p:nvPr/>
-        </p:nvSpPr>
-        <p:spPr>
-          <a:xfrm>
-            <a:off x="4601738" y="4051717"/>
-            <a:ext cx="2482541" cy="712751"/>
-          </a:xfrm>
-          <a:prstGeom prst="ellipse">
-            <a:avLst/>
-          </a:prstGeom>
-        </p:spPr>
-        <p:style>
-          <a:lnRef idx="1">
-            <a:schemeClr val="accent1"/>
-          </a:lnRef>
-          <a:fillRef idx="3">
-            <a:schemeClr val="accent1"/>
-          </a:fillRef>
-          <a:effectRef idx="2">
-            <a:schemeClr val="accent1"/>
-          </a:effectRef>
-          <a:fontRef idx="minor">
-            <a:schemeClr val="lt1"/>
-          </a:fontRef>
-        </p:style>
-        <p:txBody>
-          <a:bodyPr rtlCol="0" anchor="ctr"/>
-          <a:lstStyle/>
-          <a:p>
-            <a:pPr algn="ctr"/>
-            <a:r>
-              <a:rPr lang="en-US" sz="1200" dirty="0" err="1" smtClean="0"/>
-              <a:t>nl.dans.knaw.easy.sword</a:t>
-            </a:r>
-            <a:endParaRPr lang="en-US" sz="1200" dirty="0" smtClean="0"/>
-          </a:p>
-          <a:p>
-            <a:pPr algn="ctr"/>
-            <a:r>
-              <a:rPr lang="en-US" sz="1200" dirty="0" smtClean="0"/>
-              <a:t>Easy*</a:t>
-            </a:r>
-            <a:r>
-              <a:rPr lang="en-US" sz="1200" dirty="0" err="1" smtClean="0"/>
-              <a:t>Facade.class</a:t>
-            </a:r>
-            <a:endParaRPr lang="en-US" sz="1200" dirty="0"/>
-          </a:p>
-        </p:txBody>
-      </p:sp>
-      <p:sp>
-        <p:nvSpPr>
-          <p:cNvPr id="98" name="Rounded Rectangle 97"/>
-          <p:cNvSpPr/>
-          <p:nvPr/>
-        </p:nvSpPr>
-        <p:spPr>
-          <a:xfrm>
-            <a:off x="540320" y="333613"/>
-            <a:ext cx="1834990" cy="964384"/>
-          </a:xfrm>
-          <a:prstGeom prst="roundRect">
-            <a:avLst/>
-          </a:prstGeom>
-        </p:spPr>
-        <p:style>
-          <a:lnRef idx="1">
-            <a:schemeClr val="accent1"/>
-          </a:lnRef>
-          <a:fillRef idx="3">
-            <a:schemeClr val="accent1"/>
-          </a:fillRef>
-          <a:effectRef idx="2">
-            <a:schemeClr val="accent1"/>
-          </a:effectRef>
-          <a:fontRef idx="minor">
-            <a:schemeClr val="lt1"/>
-          </a:fontRef>
-        </p:style>
-        <p:txBody>
-          <a:bodyPr rtlCol="0" anchor="ctr"/>
-          <a:lstStyle/>
-          <a:p>
-            <a:pPr algn="ctr"/>
-            <a:r>
               <a:rPr lang="en-US" sz="1200" dirty="0" smtClean="0"/>
               <a:t>sword-common-1-1.jar</a:t>
             </a:r>
@@ -3784,7 +3865,7 @@
         </p:nvSpPr>
         <p:spPr>
           <a:xfrm>
-            <a:off x="540322" y="1873645"/>
+            <a:off x="331662" y="1873645"/>
             <a:ext cx="791676" cy="483625"/>
           </a:xfrm>
           <a:prstGeom prst="foldedCorner">
@@ -3836,7 +3917,7 @@
         </p:nvCxnSpPr>
         <p:spPr>
           <a:xfrm rot="5400000">
-            <a:off x="909164" y="1324994"/>
+            <a:off x="700504" y="1324994"/>
             <a:ext cx="575648" cy="521655"/>
           </a:xfrm>
           <a:prstGeom prst="straightConnector1">
@@ -3872,8 +3953,8 @@
         </p:nvCxnSpPr>
         <p:spPr>
           <a:xfrm rot="10800000">
-            <a:off x="1457814" y="4874722"/>
-            <a:ext cx="1375120" cy="370742"/>
+            <a:off x="1249155" y="4874722"/>
+            <a:ext cx="946201" cy="375354"/>
           </a:xfrm>
           <a:prstGeom prst="straightConnector1">
             <a:avLst/>
@@ -3905,7 +3986,7 @@
         </p:nvSpPr>
         <p:spPr>
           <a:xfrm>
-            <a:off x="2832934" y="4946878"/>
+            <a:off x="2195355" y="4951490"/>
             <a:ext cx="857841" cy="597171"/>
           </a:xfrm>
           <a:prstGeom prst="foldedCorner">
@@ -3954,7 +4035,7 @@
         </p:nvSpPr>
         <p:spPr>
           <a:xfrm>
-            <a:off x="2985333" y="5011200"/>
+            <a:off x="2347754" y="5015812"/>
             <a:ext cx="857841" cy="597171"/>
           </a:xfrm>
           <a:prstGeom prst="foldedCorner">
@@ -4003,7 +4084,7 @@
         </p:nvSpPr>
         <p:spPr>
           <a:xfrm>
-            <a:off x="3109453" y="5093062"/>
+            <a:off x="2471874" y="5097674"/>
             <a:ext cx="857841" cy="597171"/>
           </a:xfrm>
           <a:prstGeom prst="foldedCorner">
@@ -4042,7 +4123,7 @@
             <a:pPr algn="ctr"/>
             <a:r>
               <a:rPr lang="en-US" sz="1200" dirty="0" smtClean="0"/>
-              <a:t>files</a:t>
+              <a:t>data files</a:t>
             </a:r>
             <a:endParaRPr lang="en-US" sz="1200" dirty="0"/>
           </a:p>
@@ -4059,7 +4140,7 @@
         </p:nvCxnSpPr>
         <p:spPr>
           <a:xfrm rot="16200000" flipH="1">
-            <a:off x="1057175" y="2236254"/>
+            <a:off x="848515" y="2236254"/>
             <a:ext cx="279622" cy="521653"/>
           </a:xfrm>
           <a:prstGeom prst="straightConnector1">
@@ -4092,7 +4173,7 @@
         </p:nvSpPr>
         <p:spPr>
           <a:xfrm>
-            <a:off x="4601738" y="5116653"/>
+            <a:off x="4076931" y="4867490"/>
             <a:ext cx="2919481" cy="573580"/>
           </a:xfrm>
           <a:prstGeom prst="ellipse">
@@ -4144,9 +4225,9 @@
           <p:nvPr/>
         </p:nvCxnSpPr>
         <p:spPr>
-          <a:xfrm rot="10800000">
-            <a:off x="3967294" y="5391649"/>
-            <a:ext cx="634444" cy="11795"/>
+          <a:xfrm rot="10800000" flipV="1">
+            <a:off x="3329715" y="5154280"/>
+            <a:ext cx="747216" cy="241980"/>
           </a:xfrm>
           <a:prstGeom prst="straightConnector1">
             <a:avLst/>
@@ -4181,8 +4262,8 @@
         </p:nvCxnSpPr>
         <p:spPr>
           <a:xfrm rot="5400000">
-            <a:off x="6313693" y="4125791"/>
-            <a:ext cx="1854840" cy="294883"/>
+            <a:off x="5917568" y="4005308"/>
+            <a:ext cx="1597477" cy="294884"/>
           </a:xfrm>
           <a:prstGeom prst="straightConnector1">
             <a:avLst/>
@@ -4217,8 +4298,8 @@
         </p:nvCxnSpPr>
         <p:spPr>
           <a:xfrm rot="5400000">
-            <a:off x="4873718" y="3437392"/>
-            <a:ext cx="810285" cy="627124"/>
+            <a:off x="4527301" y="3277391"/>
+            <a:ext cx="463694" cy="616937"/>
           </a:xfrm>
           <a:prstGeom prst="straightConnector1">
             <a:avLst/>
@@ -4253,8 +4334,8 @@
         </p:nvCxnSpPr>
         <p:spPr>
           <a:xfrm rot="16200000" flipH="1">
-            <a:off x="5776152" y="4831325"/>
-            <a:ext cx="352185" cy="218470"/>
+            <a:off x="5211825" y="4542642"/>
+            <a:ext cx="441413" cy="208282"/>
           </a:xfrm>
           <a:prstGeom prst="straightConnector1">
             <a:avLst/>
@@ -4289,8 +4370,8 @@
         </p:nvCxnSpPr>
         <p:spPr>
           <a:xfrm rot="10800000">
-            <a:off x="1457815" y="4874722"/>
-            <a:ext cx="1527519" cy="1330514"/>
+            <a:off x="1249154" y="4874722"/>
+            <a:ext cx="1098600" cy="1335126"/>
           </a:xfrm>
           <a:prstGeom prst="straightConnector1">
             <a:avLst/>
@@ -4322,7 +4403,7 @@
         </p:nvSpPr>
         <p:spPr>
           <a:xfrm>
-            <a:off x="2985333" y="5906650"/>
+            <a:off x="2347754" y="5911262"/>
             <a:ext cx="857841" cy="597171"/>
           </a:xfrm>
           <a:prstGeom prst="foldedCorner">
@@ -4357,7 +4438,18 @@
             <a:pPr algn="ctr"/>
             <a:r>
               <a:rPr lang="en-US" sz="1200" dirty="0" smtClean="0"/>
-              <a:t>Meta Data</a:t>
+              <a:t>Meta</a:t>
+            </a:r>
+          </a:p>
+          <a:p>
+            <a:pPr algn="ctr"/>
+            <a:r>
+              <a:rPr lang="en-US" sz="1200" dirty="0" smtClean="0"/>
+              <a:t> </a:t>
+            </a:r>
+            <a:r>
+              <a:rPr lang="en-US" sz="1200" dirty="0" smtClean="0"/>
+              <a:t>Data</a:t>
             </a:r>
             <a:endParaRPr lang="en-US" sz="1200" dirty="0"/>
           </a:p>
@@ -4367,15 +4459,15 @@
         <p:nvCxnSpPr>
           <p:cNvPr id="244" name="Straight Arrow Connector 243"/>
           <p:cNvCxnSpPr>
-            <a:stCxn id="125" idx="3"/>
+            <a:stCxn id="75" idx="2"/>
             <a:endCxn id="243" idx="3"/>
           </p:cNvCxnSpPr>
           <p:nvPr/>
         </p:nvCxnSpPr>
         <p:spPr>
-          <a:xfrm rot="5400000">
-            <a:off x="4136729" y="5312679"/>
-            <a:ext cx="599002" cy="1186112"/>
+          <a:xfrm rot="10800000" flipV="1">
+            <a:off x="3205596" y="6198052"/>
+            <a:ext cx="871337" cy="11796"/>
           </a:xfrm>
           <a:prstGeom prst="straightConnector1">
             <a:avLst/>
@@ -4407,7 +4499,7 @@
         </p:nvSpPr>
         <p:spPr>
           <a:xfrm>
-            <a:off x="1553955" y="1873644"/>
+            <a:off x="1345295" y="1873644"/>
             <a:ext cx="821355" cy="483625"/>
           </a:xfrm>
           <a:prstGeom prst="foldedCorner">
@@ -4452,7 +4544,7 @@
         </p:nvCxnSpPr>
         <p:spPr>
           <a:xfrm rot="16200000" flipV="1">
-            <a:off x="1423401" y="1332412"/>
+            <a:off x="1214741" y="1332412"/>
             <a:ext cx="575647" cy="506818"/>
           </a:xfrm>
           <a:prstGeom prst="straightConnector1">
@@ -4488,7 +4580,7 @@
         </p:nvCxnSpPr>
         <p:spPr>
           <a:xfrm rot="5400000" flipH="1" flipV="1">
-            <a:off x="1571412" y="2243671"/>
+            <a:off x="1362752" y="2243671"/>
             <a:ext cx="279623" cy="506820"/>
           </a:xfrm>
           <a:prstGeom prst="straightConnector1">
@@ -4521,15 +4613,15 @@
         </p:nvSpPr>
         <p:spPr>
           <a:xfrm>
-            <a:off x="3388526" y="333613"/>
-            <a:ext cx="4891588" cy="824650"/>
+            <a:off x="2872409" y="333613"/>
+            <a:ext cx="4552926" cy="1015663"/>
           </a:xfrm>
           <a:prstGeom prst="borderCallout1">
             <a:avLst>
               <a:gd name="adj1" fmla="val 53190"/>
               <a:gd name="adj2" fmla="val -623"/>
-              <a:gd name="adj3" fmla="val 94588"/>
-              <a:gd name="adj4" fmla="val -14395"/>
+              <a:gd name="adj3" fmla="val 66971"/>
+              <a:gd name="adj4" fmla="val -11428"/>
             </a:avLst>
           </a:prstGeom>
         </p:spPr>
@@ -4552,6 +4644,15 @@
           <a:lstStyle/>
           <a:p>
             <a:r>
+              <a:rPr lang="en-US" sz="1200" dirty="0" smtClean="0"/>
+              <a:t>Alternatives:</a:t>
+            </a:r>
+          </a:p>
+          <a:p>
+            <a:endParaRPr lang="en-US" sz="1200" dirty="0" smtClean="0"/>
+          </a:p>
+          <a:p>
+            <a:r>
               <a:rPr lang="en-US" sz="1200" dirty="0" smtClean="0">
                 <a:hlinkClick r:id="rId2"/>
               </a:rPr>
@@ -4585,8 +4686,418 @@
             </a:r>
             <a:r>
               <a:rPr lang="en-US" sz="1200" dirty="0" smtClean="0"/>
-              <a:t> 	</a:t>
-            </a:r>
+              <a:t> </a:t>
+            </a:r>
+          </a:p>
+        </p:txBody>
+      </p:sp>
+      <p:cxnSp>
+        <p:nvCxnSpPr>
+          <p:cNvPr id="38" name="Straight Arrow Connector 37"/>
+          <p:cNvCxnSpPr>
+            <a:stCxn id="39" idx="2"/>
+            <a:endCxn id="125" idx="6"/>
+          </p:cNvCxnSpPr>
+          <p:nvPr/>
+        </p:nvCxnSpPr>
+        <p:spPr>
+          <a:xfrm rot="5400000">
+            <a:off x="7240331" y="4323156"/>
+            <a:ext cx="587205" cy="1075042"/>
+          </a:xfrm>
+          <a:prstGeom prst="straightConnector1">
+            <a:avLst/>
+          </a:prstGeom>
+          <a:ln>
+            <a:tailEnd type="arrow"/>
+          </a:ln>
+        </p:spPr>
+        <p:style>
+          <a:lnRef idx="2">
+            <a:schemeClr val="accent2"/>
+          </a:lnRef>
+          <a:fillRef idx="0">
+            <a:schemeClr val="accent2"/>
+          </a:fillRef>
+          <a:effectRef idx="1">
+            <a:schemeClr val="accent2"/>
+          </a:effectRef>
+          <a:fontRef idx="minor">
+            <a:schemeClr val="tx1"/>
+          </a:fontRef>
+        </p:style>
+      </p:cxnSp>
+      <p:sp>
+        <p:nvSpPr>
+          <p:cNvPr id="39" name="Folded Corner 38"/>
+          <p:cNvSpPr/>
+          <p:nvPr/>
+        </p:nvSpPr>
+        <p:spPr>
+          <a:xfrm>
+            <a:off x="7642533" y="3969904"/>
+            <a:ext cx="857841" cy="597171"/>
+          </a:xfrm>
+          <a:prstGeom prst="foldedCorner">
+            <a:avLst/>
+          </a:prstGeom>
+        </p:spPr>
+        <p:style>
+          <a:lnRef idx="1">
+            <a:schemeClr val="accent2"/>
+          </a:lnRef>
+          <a:fillRef idx="2">
+            <a:schemeClr val="accent2"/>
+          </a:fillRef>
+          <a:effectRef idx="1">
+            <a:schemeClr val="accent2"/>
+          </a:effectRef>
+          <a:fontRef idx="minor">
+            <a:schemeClr val="dk1"/>
+          </a:fontRef>
+        </p:style>
+        <p:txBody>
+          <a:bodyPr rtlCol="0" anchor="ctr"/>
+          <a:lstStyle/>
+          <a:p>
+            <a:pPr algn="ctr"/>
+            <a:r>
+              <a:rPr lang="en-US" sz="1200" dirty="0" smtClean="0"/>
+              <a:t>uploaded</a:t>
+            </a:r>
+          </a:p>
+          <a:p>
+            <a:pPr algn="ctr"/>
+            <a:r>
+              <a:rPr lang="en-US" sz="1200" dirty="0" smtClean="0"/>
+              <a:t>zip file</a:t>
+            </a:r>
+          </a:p>
+        </p:txBody>
+      </p:sp>
+      <p:cxnSp>
+        <p:nvCxnSpPr>
+          <p:cNvPr id="40" name="Straight Arrow Connector 39"/>
+          <p:cNvCxnSpPr>
+            <a:stCxn id="73" idx="6"/>
+            <a:endCxn id="39" idx="0"/>
+          </p:cNvCxnSpPr>
+          <p:nvPr/>
+        </p:nvCxnSpPr>
+        <p:spPr>
+          <a:xfrm>
+            <a:off x="7235739" y="3094351"/>
+            <a:ext cx="835715" cy="875553"/>
+          </a:xfrm>
+          <a:prstGeom prst="straightConnector1">
+            <a:avLst/>
+          </a:prstGeom>
+          <a:ln>
+            <a:tailEnd type="arrow"/>
+          </a:ln>
+        </p:spPr>
+        <p:style>
+          <a:lnRef idx="2">
+            <a:schemeClr val="accent2"/>
+          </a:lnRef>
+          <a:fillRef idx="0">
+            <a:schemeClr val="accent2"/>
+          </a:fillRef>
+          <a:effectRef idx="1">
+            <a:schemeClr val="accent2"/>
+          </a:effectRef>
+          <a:fontRef idx="minor">
+            <a:schemeClr val="tx1"/>
+          </a:fontRef>
+        </p:style>
+      </p:cxnSp>
+      <p:sp>
+        <p:nvSpPr>
+          <p:cNvPr id="75" name="Oval 74"/>
+          <p:cNvSpPr/>
+          <p:nvPr/>
+        </p:nvSpPr>
+        <p:spPr>
+          <a:xfrm>
+            <a:off x="4076932" y="5911262"/>
+            <a:ext cx="2919481" cy="573580"/>
+          </a:xfrm>
+          <a:prstGeom prst="ellipse">
+            <a:avLst/>
+          </a:prstGeom>
+        </p:spPr>
+        <p:style>
+          <a:lnRef idx="1">
+            <a:schemeClr val="accent1"/>
+          </a:lnRef>
+          <a:fillRef idx="3">
+            <a:schemeClr val="accent1"/>
+          </a:fillRef>
+          <a:effectRef idx="2">
+            <a:schemeClr val="accent1"/>
+          </a:effectRef>
+          <a:fontRef idx="minor">
+            <a:schemeClr val="lt1"/>
+          </a:fontRef>
+        </p:style>
+        <p:txBody>
+          <a:bodyPr rtlCol="0" anchor="ctr"/>
+          <a:lstStyle/>
+          <a:p>
+            <a:pPr algn="ctr"/>
+            <a:r>
+              <a:rPr lang="en-US" sz="1200" dirty="0" err="1" smtClean="0"/>
+              <a:t>nl.dans.knaw.l.def.crosswalk</a:t>
+            </a:r>
+            <a:r>
+              <a:rPr lang="en-US" sz="1200" dirty="0" smtClean="0"/>
+              <a:t>.*</a:t>
+            </a:r>
+          </a:p>
+          <a:p>
+            <a:pPr algn="ctr"/>
+            <a:r>
+              <a:rPr lang="en-US" sz="1200" dirty="0" smtClean="0"/>
+              <a:t>*</a:t>
+            </a:r>
+            <a:r>
+              <a:rPr lang="en-US" sz="1200" dirty="0" err="1" smtClean="0"/>
+              <a:t>EmdCrosswalk.class</a:t>
+            </a:r>
+            <a:endParaRPr lang="en-US" sz="1200" dirty="0"/>
+          </a:p>
+        </p:txBody>
+      </p:sp>
+      <p:cxnSp>
+        <p:nvCxnSpPr>
+          <p:cNvPr id="79" name="Straight Arrow Connector 78"/>
+          <p:cNvCxnSpPr>
+            <a:stCxn id="125" idx="4"/>
+            <a:endCxn id="75" idx="0"/>
+          </p:cNvCxnSpPr>
+          <p:nvPr/>
+        </p:nvCxnSpPr>
+        <p:spPr>
+          <a:xfrm rot="16200000" flipH="1">
+            <a:off x="5301576" y="5676165"/>
+            <a:ext cx="470192" cy="1"/>
+          </a:xfrm>
+          <a:prstGeom prst="straightConnector1">
+            <a:avLst/>
+          </a:prstGeom>
+          <a:ln>
+            <a:tailEnd type="arrow"/>
+          </a:ln>
+        </p:spPr>
+        <p:style>
+          <a:lnRef idx="2">
+            <a:schemeClr val="accent3"/>
+          </a:lnRef>
+          <a:fillRef idx="0">
+            <a:schemeClr val="accent3"/>
+          </a:fillRef>
+          <a:effectRef idx="1">
+            <a:schemeClr val="accent3"/>
+          </a:effectRef>
+          <a:fontRef idx="minor">
+            <a:schemeClr val="tx1"/>
+          </a:fontRef>
+        </p:style>
+      </p:cxnSp>
+      <p:cxnSp>
+        <p:nvCxnSpPr>
+          <p:cNvPr id="84" name="Straight Arrow Connector 83"/>
+          <p:cNvCxnSpPr>
+            <a:stCxn id="65" idx="1"/>
+            <a:endCxn id="75" idx="6"/>
+          </p:cNvCxnSpPr>
+          <p:nvPr/>
+        </p:nvCxnSpPr>
+        <p:spPr>
+          <a:xfrm rot="10800000" flipV="1">
+            <a:off x="6996414" y="5819560"/>
+            <a:ext cx="717447" cy="378491"/>
+          </a:xfrm>
+          <a:prstGeom prst="straightConnector1">
+            <a:avLst/>
+          </a:prstGeom>
+          <a:ln>
+            <a:tailEnd type="arrow"/>
+          </a:ln>
+        </p:spPr>
+        <p:style>
+          <a:lnRef idx="2">
+            <a:schemeClr val="accent2"/>
+          </a:lnRef>
+          <a:fillRef idx="0">
+            <a:schemeClr val="accent2"/>
+          </a:fillRef>
+          <a:effectRef idx="1">
+            <a:schemeClr val="accent2"/>
+          </a:effectRef>
+          <a:fontRef idx="minor">
+            <a:schemeClr val="tx1"/>
+          </a:fontRef>
+        </p:style>
+      </p:cxnSp>
+      <p:cxnSp>
+        <p:nvCxnSpPr>
+          <p:cNvPr id="86" name="Straight Arrow Connector 85"/>
+          <p:cNvCxnSpPr>
+            <a:stCxn id="125" idx="5"/>
+            <a:endCxn id="65" idx="1"/>
+          </p:cNvCxnSpPr>
+          <p:nvPr/>
+        </p:nvCxnSpPr>
+        <p:spPr>
+          <a:xfrm rot="16200000" flipH="1">
+            <a:off x="6910117" y="5015818"/>
+            <a:ext cx="462490" cy="1144996"/>
+          </a:xfrm>
+          <a:prstGeom prst="straightConnector1">
+            <a:avLst/>
+          </a:prstGeom>
+          <a:ln>
+            <a:tailEnd type="arrow"/>
+          </a:ln>
+        </p:spPr>
+        <p:style>
+          <a:lnRef idx="2">
+            <a:schemeClr val="accent2"/>
+          </a:lnRef>
+          <a:fillRef idx="0">
+            <a:schemeClr val="accent2"/>
+          </a:fillRef>
+          <a:effectRef idx="1">
+            <a:schemeClr val="accent2"/>
+          </a:effectRef>
+          <a:fontRef idx="minor">
+            <a:schemeClr val="tx1"/>
+          </a:fontRef>
+        </p:style>
+      </p:cxnSp>
+      <p:cxnSp>
+        <p:nvCxnSpPr>
+          <p:cNvPr id="50" name="Straight Arrow Connector 49"/>
+          <p:cNvCxnSpPr/>
+          <p:nvPr/>
+        </p:nvCxnSpPr>
+        <p:spPr>
+          <a:xfrm flipV="1">
+            <a:off x="7713860" y="800556"/>
+            <a:ext cx="1069896" cy="12590"/>
+          </a:xfrm>
+          <a:prstGeom prst="straightConnector1">
+            <a:avLst/>
+          </a:prstGeom>
+          <a:ln>
+            <a:tailEnd type="arrow"/>
+          </a:ln>
+        </p:spPr>
+        <p:style>
+          <a:lnRef idx="2">
+            <a:schemeClr val="accent2"/>
+          </a:lnRef>
+          <a:fillRef idx="0">
+            <a:schemeClr val="accent2"/>
+          </a:fillRef>
+          <a:effectRef idx="1">
+            <a:schemeClr val="accent2"/>
+          </a:effectRef>
+          <a:fontRef idx="minor">
+            <a:schemeClr val="tx1"/>
+          </a:fontRef>
+        </p:style>
+      </p:cxnSp>
+      <p:cxnSp>
+        <p:nvCxnSpPr>
+          <p:cNvPr id="54" name="Straight Arrow Connector 53"/>
+          <p:cNvCxnSpPr/>
+          <p:nvPr/>
+        </p:nvCxnSpPr>
+        <p:spPr>
+          <a:xfrm flipV="1">
+            <a:off x="7713860" y="1204022"/>
+            <a:ext cx="1056604" cy="23594"/>
+          </a:xfrm>
+          <a:prstGeom prst="straightConnector1">
+            <a:avLst/>
+          </a:prstGeom>
+          <a:ln>
+            <a:tailEnd type="arrow"/>
+          </a:ln>
+        </p:spPr>
+        <p:style>
+          <a:lnRef idx="2">
+            <a:schemeClr val="accent3"/>
+          </a:lnRef>
+          <a:fillRef idx="0">
+            <a:schemeClr val="accent3"/>
+          </a:fillRef>
+          <a:effectRef idx="1">
+            <a:schemeClr val="accent3"/>
+          </a:effectRef>
+          <a:fontRef idx="minor">
+            <a:schemeClr val="tx1"/>
+          </a:fontRef>
+        </p:style>
+      </p:cxnSp>
+      <p:sp>
+        <p:nvSpPr>
+          <p:cNvPr id="65" name="Folded Corner 64"/>
+          <p:cNvSpPr/>
+          <p:nvPr/>
+        </p:nvSpPr>
+        <p:spPr>
+          <a:xfrm>
+            <a:off x="7713860" y="5441070"/>
+            <a:ext cx="857841" cy="756982"/>
+          </a:xfrm>
+          <a:prstGeom prst="foldedCorner">
+            <a:avLst/>
+          </a:prstGeom>
+        </p:spPr>
+        <p:style>
+          <a:lnRef idx="1">
+            <a:schemeClr val="accent2"/>
+          </a:lnRef>
+          <a:fillRef idx="2">
+            <a:schemeClr val="accent2"/>
+          </a:fillRef>
+          <a:effectRef idx="1">
+            <a:schemeClr val="accent2"/>
+          </a:effectRef>
+          <a:fontRef idx="minor">
+            <a:schemeClr val="dk1"/>
+          </a:fontRef>
+        </p:style>
+        <p:txBody>
+          <a:bodyPr rtlCol="0" anchor="t" anchorCtr="0"/>
+          <a:lstStyle/>
+          <a:p>
+            <a:r>
+              <a:rPr lang="en-US" sz="1200" dirty="0" smtClean="0"/>
+              <a:t>* = </a:t>
+            </a:r>
+          </a:p>
+          <a:p>
+            <a:r>
+              <a:rPr lang="en-US" sz="1000" dirty="0" smtClean="0"/>
+              <a:t>   DANS</a:t>
+            </a:r>
+          </a:p>
+          <a:p>
+            <a:r>
+              <a:rPr lang="en-US" sz="1000" dirty="0" smtClean="0"/>
+              <a:t>   Dataset</a:t>
+            </a:r>
+          </a:p>
+          <a:p>
+            <a:r>
+              <a:rPr lang="en-US" sz="1000" dirty="0" smtClean="0"/>
+              <a:t>   Metadata</a:t>
+            </a:r>
+            <a:endParaRPr lang="en-US" sz="1000" dirty="0" smtClean="0"/>
           </a:p>
         </p:txBody>
       </p:sp>

</xml_diff>

<commit_message>
synchronised documentation with renamed class
git-svn-id: svn+ssh://develop01.dans.knaw.nl/development/svn/repos/mixed/easy-sword/trunk@11634 a75a9a65-0d41-4860-8c96-5fae3ec79aa9
</commit_message>
<xml_diff>
--- a/doc/overview.pptx
+++ b/doc/overview.pptx
@@ -1,6 +1,6 @@
 
 <file path=ppt/presentation.xml><?xml version="1.0" encoding="utf-8"?>
-<p:presentation xmlns:a="http://schemas.openxmlformats.org/drawingml/2006/main" xmlns:r="http://schemas.openxmlformats.org/officeDocument/2006/relationships" xmlns:mc="http://schemas.openxmlformats.org/markup-compatibility/2006" xmlns:mv="urn:schemas-microsoft-com:mac:vml" xmlns:p="http://schemas.openxmlformats.org/presentationml/2006/main" mc:Ignorable="mv" mc:PreserveAttributes="mv:*" saveSubsetFonts="1" autoCompressPictures="0">
+<p:presentation xmlns:a="http://schemas.openxmlformats.org/drawingml/2006/main" xmlns:r="http://schemas.openxmlformats.org/officeDocument/2006/relationships" xmlns:p="http://schemas.openxmlformats.org/presentationml/2006/main" saveSubsetFonts="1" autoCompressPictures="0">
   <p:sldMasterIdLst>
     <p:sldMasterId id="2147483648" r:id="rId1"/>
   </p:sldMasterIdLst>
@@ -108,7 +108,7 @@
 </file>
 
 <file path=ppt/slideLayouts/slideLayout1.xml><?xml version="1.0" encoding="utf-8"?>
-<p:sldLayout xmlns:a="http://schemas.openxmlformats.org/drawingml/2006/main" xmlns:r="http://schemas.openxmlformats.org/officeDocument/2006/relationships" xmlns:mc="http://schemas.openxmlformats.org/markup-compatibility/2006" xmlns:mv="urn:schemas-microsoft-com:mac:vml" xmlns:p="http://schemas.openxmlformats.org/presentationml/2006/main" mc:Ignorable="mv" mc:PreserveAttributes="mv:*" type="title" preserve="1">
+<p:sldLayout xmlns:a="http://schemas.openxmlformats.org/drawingml/2006/main" xmlns:r="http://schemas.openxmlformats.org/officeDocument/2006/relationships" xmlns:p="http://schemas.openxmlformats.org/presentationml/2006/main" type="title" preserve="1">
   <p:cSld name="Title Slide">
     <p:spTree>
       <p:nvGrpSpPr>
@@ -289,7 +289,7 @@
             <a:fld id="{64F2D27B-4C84-BD47-81A2-1F67C3F43376}" type="datetimeFigureOut">
               <a:rPr lang="en-US" smtClean="0"/>
               <a:pPr/>
-              <a:t>5/7/12</a:t>
+              <a:t>9/3/12</a:t>
             </a:fld>
             <a:endParaRPr lang="en-US"/>
           </a:p>
@@ -347,7 +347,7 @@
 </file>
 
 <file path=ppt/slideLayouts/slideLayout10.xml><?xml version="1.0" encoding="utf-8"?>
-<p:sldLayout xmlns:a="http://schemas.openxmlformats.org/drawingml/2006/main" xmlns:r="http://schemas.openxmlformats.org/officeDocument/2006/relationships" xmlns:mc="http://schemas.openxmlformats.org/markup-compatibility/2006" xmlns:mv="urn:schemas-microsoft-com:mac:vml" xmlns:p="http://schemas.openxmlformats.org/presentationml/2006/main" mc:Ignorable="mv" mc:PreserveAttributes="mv:*" type="vertTx" preserve="1">
+<p:sldLayout xmlns:a="http://schemas.openxmlformats.org/drawingml/2006/main" xmlns:r="http://schemas.openxmlformats.org/officeDocument/2006/relationships" xmlns:p="http://schemas.openxmlformats.org/presentationml/2006/main" type="vertTx" preserve="1">
   <p:cSld name="Title and Vertical Text">
     <p:spTree>
       <p:nvGrpSpPr>
@@ -456,7 +456,7 @@
             <a:fld id="{64F2D27B-4C84-BD47-81A2-1F67C3F43376}" type="datetimeFigureOut">
               <a:rPr lang="en-US" smtClean="0"/>
               <a:pPr/>
-              <a:t>5/7/12</a:t>
+              <a:t>9/3/12</a:t>
             </a:fld>
             <a:endParaRPr lang="en-US"/>
           </a:p>
@@ -514,7 +514,7 @@
 </file>
 
 <file path=ppt/slideLayouts/slideLayout11.xml><?xml version="1.0" encoding="utf-8"?>
-<p:sldLayout xmlns:a="http://schemas.openxmlformats.org/drawingml/2006/main" xmlns:r="http://schemas.openxmlformats.org/officeDocument/2006/relationships" xmlns:mc="http://schemas.openxmlformats.org/markup-compatibility/2006" xmlns:mv="urn:schemas-microsoft-com:mac:vml" xmlns:p="http://schemas.openxmlformats.org/presentationml/2006/main" mc:Ignorable="mv" mc:PreserveAttributes="mv:*" type="vertTitleAndTx" preserve="1">
+<p:sldLayout xmlns:a="http://schemas.openxmlformats.org/drawingml/2006/main" xmlns:r="http://schemas.openxmlformats.org/officeDocument/2006/relationships" xmlns:p="http://schemas.openxmlformats.org/presentationml/2006/main" type="vertTitleAndTx" preserve="1">
   <p:cSld name="Vertical Title and Text">
     <p:spTree>
       <p:nvGrpSpPr>
@@ -633,7 +633,7 @@
             <a:fld id="{64F2D27B-4C84-BD47-81A2-1F67C3F43376}" type="datetimeFigureOut">
               <a:rPr lang="en-US" smtClean="0"/>
               <a:pPr/>
-              <a:t>5/7/12</a:t>
+              <a:t>9/3/12</a:t>
             </a:fld>
             <a:endParaRPr lang="en-US"/>
           </a:p>
@@ -691,7 +691,7 @@
 </file>
 
 <file path=ppt/slideLayouts/slideLayout2.xml><?xml version="1.0" encoding="utf-8"?>
-<p:sldLayout xmlns:a="http://schemas.openxmlformats.org/drawingml/2006/main" xmlns:r="http://schemas.openxmlformats.org/officeDocument/2006/relationships" xmlns:mc="http://schemas.openxmlformats.org/markup-compatibility/2006" xmlns:mv="urn:schemas-microsoft-com:mac:vml" xmlns:p="http://schemas.openxmlformats.org/presentationml/2006/main" mc:Ignorable="mv" mc:PreserveAttributes="mv:*" type="obj" preserve="1">
+<p:sldLayout xmlns:a="http://schemas.openxmlformats.org/drawingml/2006/main" xmlns:r="http://schemas.openxmlformats.org/officeDocument/2006/relationships" xmlns:p="http://schemas.openxmlformats.org/presentationml/2006/main" type="obj" preserve="1">
   <p:cSld name="Title and Content">
     <p:spTree>
       <p:nvGrpSpPr>
@@ -800,7 +800,7 @@
             <a:fld id="{64F2D27B-4C84-BD47-81A2-1F67C3F43376}" type="datetimeFigureOut">
               <a:rPr lang="en-US" smtClean="0"/>
               <a:pPr/>
-              <a:t>5/7/12</a:t>
+              <a:t>9/3/12</a:t>
             </a:fld>
             <a:endParaRPr lang="en-US"/>
           </a:p>
@@ -858,7 +858,7 @@
 </file>
 
 <file path=ppt/slideLayouts/slideLayout3.xml><?xml version="1.0" encoding="utf-8"?>
-<p:sldLayout xmlns:a="http://schemas.openxmlformats.org/drawingml/2006/main" xmlns:r="http://schemas.openxmlformats.org/officeDocument/2006/relationships" xmlns:mc="http://schemas.openxmlformats.org/markup-compatibility/2006" xmlns:mv="urn:schemas-microsoft-com:mac:vml" xmlns:p="http://schemas.openxmlformats.org/presentationml/2006/main" mc:Ignorable="mv" mc:PreserveAttributes="mv:*" type="secHead" preserve="1">
+<p:sldLayout xmlns:a="http://schemas.openxmlformats.org/drawingml/2006/main" xmlns:r="http://schemas.openxmlformats.org/officeDocument/2006/relationships" xmlns:p="http://schemas.openxmlformats.org/presentationml/2006/main" type="secHead" preserve="1">
   <p:cSld name="Section Header">
     <p:spTree>
       <p:nvGrpSpPr>
@@ -1043,7 +1043,7 @@
             <a:fld id="{64F2D27B-4C84-BD47-81A2-1F67C3F43376}" type="datetimeFigureOut">
               <a:rPr lang="en-US" smtClean="0"/>
               <a:pPr/>
-              <a:t>5/7/12</a:t>
+              <a:t>9/3/12</a:t>
             </a:fld>
             <a:endParaRPr lang="en-US"/>
           </a:p>
@@ -1101,7 +1101,7 @@
 </file>
 
 <file path=ppt/slideLayouts/slideLayout4.xml><?xml version="1.0" encoding="utf-8"?>
-<p:sldLayout xmlns:a="http://schemas.openxmlformats.org/drawingml/2006/main" xmlns:r="http://schemas.openxmlformats.org/officeDocument/2006/relationships" xmlns:mc="http://schemas.openxmlformats.org/markup-compatibility/2006" xmlns:mv="urn:schemas-microsoft-com:mac:vml" xmlns:p="http://schemas.openxmlformats.org/presentationml/2006/main" mc:Ignorable="mv" mc:PreserveAttributes="mv:*" type="twoObj" preserve="1">
+<p:sldLayout xmlns:a="http://schemas.openxmlformats.org/drawingml/2006/main" xmlns:r="http://schemas.openxmlformats.org/officeDocument/2006/relationships" xmlns:p="http://schemas.openxmlformats.org/presentationml/2006/main" type="twoObj" preserve="1">
   <p:cSld name="Two Content">
     <p:spTree>
       <p:nvGrpSpPr>
@@ -1328,7 +1328,7 @@
             <a:fld id="{64F2D27B-4C84-BD47-81A2-1F67C3F43376}" type="datetimeFigureOut">
               <a:rPr lang="en-US" smtClean="0"/>
               <a:pPr/>
-              <a:t>5/7/12</a:t>
+              <a:t>9/3/12</a:t>
             </a:fld>
             <a:endParaRPr lang="en-US"/>
           </a:p>
@@ -1386,7 +1386,7 @@
 </file>
 
 <file path=ppt/slideLayouts/slideLayout5.xml><?xml version="1.0" encoding="utf-8"?>
-<p:sldLayout xmlns:a="http://schemas.openxmlformats.org/drawingml/2006/main" xmlns:r="http://schemas.openxmlformats.org/officeDocument/2006/relationships" xmlns:mc="http://schemas.openxmlformats.org/markup-compatibility/2006" xmlns:mv="urn:schemas-microsoft-com:mac:vml" xmlns:p="http://schemas.openxmlformats.org/presentationml/2006/main" mc:Ignorable="mv" mc:PreserveAttributes="mv:*" type="twoTxTwoObj" preserve="1">
+<p:sldLayout xmlns:a="http://schemas.openxmlformats.org/drawingml/2006/main" xmlns:r="http://schemas.openxmlformats.org/officeDocument/2006/relationships" xmlns:p="http://schemas.openxmlformats.org/presentationml/2006/main" type="twoTxTwoObj" preserve="1">
   <p:cSld name="Comparison">
     <p:spTree>
       <p:nvGrpSpPr>
@@ -1747,7 +1747,7 @@
             <a:fld id="{64F2D27B-4C84-BD47-81A2-1F67C3F43376}" type="datetimeFigureOut">
               <a:rPr lang="en-US" smtClean="0"/>
               <a:pPr/>
-              <a:t>5/7/12</a:t>
+              <a:t>9/3/12</a:t>
             </a:fld>
             <a:endParaRPr lang="en-US"/>
           </a:p>
@@ -1805,7 +1805,7 @@
 </file>
 
 <file path=ppt/slideLayouts/slideLayout6.xml><?xml version="1.0" encoding="utf-8"?>
-<p:sldLayout xmlns:a="http://schemas.openxmlformats.org/drawingml/2006/main" xmlns:r="http://schemas.openxmlformats.org/officeDocument/2006/relationships" xmlns:mc="http://schemas.openxmlformats.org/markup-compatibility/2006" xmlns:mv="urn:schemas-microsoft-com:mac:vml" xmlns:p="http://schemas.openxmlformats.org/presentationml/2006/main" mc:Ignorable="mv" mc:PreserveAttributes="mv:*" type="titleOnly" preserve="1">
+<p:sldLayout xmlns:a="http://schemas.openxmlformats.org/drawingml/2006/main" xmlns:r="http://schemas.openxmlformats.org/officeDocument/2006/relationships" xmlns:p="http://schemas.openxmlformats.org/presentationml/2006/main" type="titleOnly" preserve="1">
   <p:cSld name="Title Only">
     <p:spTree>
       <p:nvGrpSpPr>
@@ -1862,7 +1862,7 @@
             <a:fld id="{64F2D27B-4C84-BD47-81A2-1F67C3F43376}" type="datetimeFigureOut">
               <a:rPr lang="en-US" smtClean="0"/>
               <a:pPr/>
-              <a:t>5/7/12</a:t>
+              <a:t>9/3/12</a:t>
             </a:fld>
             <a:endParaRPr lang="en-US"/>
           </a:p>
@@ -1920,7 +1920,7 @@
 </file>
 
 <file path=ppt/slideLayouts/slideLayout7.xml><?xml version="1.0" encoding="utf-8"?>
-<p:sldLayout xmlns:a="http://schemas.openxmlformats.org/drawingml/2006/main" xmlns:r="http://schemas.openxmlformats.org/officeDocument/2006/relationships" xmlns:mc="http://schemas.openxmlformats.org/markup-compatibility/2006" xmlns:mv="urn:schemas-microsoft-com:mac:vml" xmlns:p="http://schemas.openxmlformats.org/presentationml/2006/main" mc:Ignorable="mv" mc:PreserveAttributes="mv:*" type="blank" preserve="1">
+<p:sldLayout xmlns:a="http://schemas.openxmlformats.org/drawingml/2006/main" xmlns:r="http://schemas.openxmlformats.org/officeDocument/2006/relationships" xmlns:p="http://schemas.openxmlformats.org/presentationml/2006/main" type="blank" preserve="1">
   <p:cSld name="Blank">
     <p:spTree>
       <p:nvGrpSpPr>
@@ -1954,7 +1954,7 @@
             <a:fld id="{64F2D27B-4C84-BD47-81A2-1F67C3F43376}" type="datetimeFigureOut">
               <a:rPr lang="en-US" smtClean="0"/>
               <a:pPr/>
-              <a:t>5/7/12</a:t>
+              <a:t>9/3/12</a:t>
             </a:fld>
             <a:endParaRPr lang="en-US"/>
           </a:p>
@@ -2012,7 +2012,7 @@
 </file>
 
 <file path=ppt/slideLayouts/slideLayout8.xml><?xml version="1.0" encoding="utf-8"?>
-<p:sldLayout xmlns:a="http://schemas.openxmlformats.org/drawingml/2006/main" xmlns:r="http://schemas.openxmlformats.org/officeDocument/2006/relationships" xmlns:mc="http://schemas.openxmlformats.org/markup-compatibility/2006" xmlns:mv="urn:schemas-microsoft-com:mac:vml" xmlns:p="http://schemas.openxmlformats.org/presentationml/2006/main" mc:Ignorable="mv" mc:PreserveAttributes="mv:*" type="objTx" preserve="1">
+<p:sldLayout xmlns:a="http://schemas.openxmlformats.org/drawingml/2006/main" xmlns:r="http://schemas.openxmlformats.org/officeDocument/2006/relationships" xmlns:p="http://schemas.openxmlformats.org/presentationml/2006/main" type="objTx" preserve="1">
   <p:cSld name="Content with Caption">
     <p:spTree>
       <p:nvGrpSpPr>
@@ -2228,7 +2228,7 @@
             <a:fld id="{64F2D27B-4C84-BD47-81A2-1F67C3F43376}" type="datetimeFigureOut">
               <a:rPr lang="en-US" smtClean="0"/>
               <a:pPr/>
-              <a:t>5/7/12</a:t>
+              <a:t>9/3/12</a:t>
             </a:fld>
             <a:endParaRPr lang="en-US"/>
           </a:p>
@@ -2286,7 +2286,7 @@
 </file>
 
 <file path=ppt/slideLayouts/slideLayout9.xml><?xml version="1.0" encoding="utf-8"?>
-<p:sldLayout xmlns:a="http://schemas.openxmlformats.org/drawingml/2006/main" xmlns:r="http://schemas.openxmlformats.org/officeDocument/2006/relationships" xmlns:mc="http://schemas.openxmlformats.org/markup-compatibility/2006" xmlns:mv="urn:schemas-microsoft-com:mac:vml" xmlns:p="http://schemas.openxmlformats.org/presentationml/2006/main" mc:Ignorable="mv" mc:PreserveAttributes="mv:*" type="picTx" preserve="1">
+<p:sldLayout xmlns:a="http://schemas.openxmlformats.org/drawingml/2006/main" xmlns:r="http://schemas.openxmlformats.org/officeDocument/2006/relationships" xmlns:p="http://schemas.openxmlformats.org/presentationml/2006/main" type="picTx" preserve="1">
   <p:cSld name="Picture with Caption">
     <p:spTree>
       <p:nvGrpSpPr>
@@ -2478,7 +2478,7 @@
             <a:fld id="{64F2D27B-4C84-BD47-81A2-1F67C3F43376}" type="datetimeFigureOut">
               <a:rPr lang="en-US" smtClean="0"/>
               <a:pPr/>
-              <a:t>5/7/12</a:t>
+              <a:t>9/3/12</a:t>
             </a:fld>
             <a:endParaRPr lang="en-US"/>
           </a:p>
@@ -2536,7 +2536,7 @@
 </file>
 
 <file path=ppt/slideMasters/slideMaster1.xml><?xml version="1.0" encoding="utf-8"?>
-<p:sldMaster xmlns:a="http://schemas.openxmlformats.org/drawingml/2006/main" xmlns:r="http://schemas.openxmlformats.org/officeDocument/2006/relationships" xmlns:mc="http://schemas.openxmlformats.org/markup-compatibility/2006" xmlns:mv="urn:schemas-microsoft-com:mac:vml" xmlns:p="http://schemas.openxmlformats.org/presentationml/2006/main" mc:Ignorable="mv" mc:PreserveAttributes="mv:*">
+<p:sldMaster xmlns:a="http://schemas.openxmlformats.org/drawingml/2006/main" xmlns:r="http://schemas.openxmlformats.org/officeDocument/2006/relationships" xmlns:p="http://schemas.openxmlformats.org/presentationml/2006/main">
   <p:cSld>
     <p:bg>
       <p:bgRef idx="1001">
@@ -2688,7 +2688,7 @@
             <a:fld id="{64F2D27B-4C84-BD47-81A2-1F67C3F43376}" type="datetimeFigureOut">
               <a:rPr lang="en-US" smtClean="0"/>
               <a:pPr/>
-              <a:t>5/7/12</a:t>
+              <a:t>9/3/12</a:t>
             </a:fld>
             <a:endParaRPr lang="en-US"/>
           </a:p>
@@ -3043,7 +3043,7 @@
 </file>
 
 <file path=ppt/slides/slide1.xml><?xml version="1.0" encoding="utf-8"?>
-<p:sld xmlns:a="http://schemas.openxmlformats.org/drawingml/2006/main" xmlns:r="http://schemas.openxmlformats.org/officeDocument/2006/relationships" xmlns:mc="http://schemas.openxmlformats.org/markup-compatibility/2006" xmlns:mv="urn:schemas-microsoft-com:mac:vml" xmlns:p="http://schemas.openxmlformats.org/presentationml/2006/main" mc:Ignorable="mv" mc:PreserveAttributes="mv:*">
+<p:sld xmlns:a="http://schemas.openxmlformats.org/drawingml/2006/main" xmlns:r="http://schemas.openxmlformats.org/officeDocument/2006/relationships" xmlns:p="http://schemas.openxmlformats.org/presentationml/2006/main">
   <p:cSld>
     <p:spTree>
       <p:nvGrpSpPr>
@@ -4209,7 +4209,11 @@
             <a:pPr algn="ctr"/>
             <a:r>
               <a:rPr lang="en-US" sz="1200" dirty="0" err="1" smtClean="0"/>
-              <a:t>Payload.class</a:t>
+              <a:t>RequestContent</a:t>
+            </a:r>
+            <a:r>
+              <a:rPr lang="en-US" sz="1200" dirty="0" err="1" smtClean="0"/>
+              <a:t>.class</a:t>
             </a:r>
             <a:endParaRPr lang="en-US" sz="1200" dirty="0"/>
           </a:p>
@@ -4445,11 +4449,7 @@
             <a:pPr algn="ctr"/>
             <a:r>
               <a:rPr lang="en-US" sz="1200" dirty="0" smtClean="0"/>
-              <a:t> </a:t>
-            </a:r>
-            <a:r>
-              <a:rPr lang="en-US" sz="1200" dirty="0" smtClean="0"/>
-              <a:t>Data</a:t>
+              <a:t> Data</a:t>
             </a:r>
             <a:endParaRPr lang="en-US" sz="1200" dirty="0"/>
           </a:p>
@@ -5097,7 +5097,6 @@
               <a:rPr lang="en-US" sz="1000" dirty="0" smtClean="0"/>
               <a:t>   Metadata</a:t>
             </a:r>
-            <a:endParaRPr lang="en-US" sz="1000" dirty="0" smtClean="0"/>
           </a:p>
         </p:txBody>
       </p:sp>
@@ -5109,7 +5108,7 @@
   <p:timing>
     <p:tnLst>
       <p:par>
-        <p:cTn id="1" dur="indefinite" restart="never" nodeType="tmRoot"/>
+        <p:cTn xmlns:p14="http://schemas.microsoft.com/office/powerpoint/2010/main" id="1" dur="indefinite" restart="never" nodeType="tmRoot"/>
       </p:par>
     </p:tnLst>
   </p:timing>

</xml_diff>